<commit_message>
Made final edits on my slides.
</commit_message>
<xml_diff>
--- a/Presentation/Group-12-Presentation.pptx
+++ b/Presentation/Group-12-Presentation.pptx
@@ -235,7 +235,7 @@
           <a:p>
             <a:fld id="{2573EFD2-7143-124F-89F6-73BC20B1D311}" type="datetimeFigureOut">
               <a:rPr lang="en-US" smtClean="0"/>
-              <a:t>4/23/2024</a:t>
+              <a:t>4/24/2024</a:t>
             </a:fld>
             <a:endParaRPr lang="en-US"/>
           </a:p>
@@ -1315,7 +1315,7 @@
           <a:p>
             <a:fld id="{FB67B63D-A4AC-B040-8C24-6F4366BE519E}" type="datetimeFigureOut">
               <a:rPr lang="en-US" smtClean="0"/>
-              <a:t>4/23/2024</a:t>
+              <a:t>4/24/2024</a:t>
             </a:fld>
             <a:endParaRPr lang="en-US"/>
           </a:p>
@@ -1515,7 +1515,7 @@
           <a:p>
             <a:fld id="{FB67B63D-A4AC-B040-8C24-6F4366BE519E}" type="datetimeFigureOut">
               <a:rPr lang="en-US" smtClean="0"/>
-              <a:t>4/23/2024</a:t>
+              <a:t>4/24/2024</a:t>
             </a:fld>
             <a:endParaRPr lang="en-US"/>
           </a:p>
@@ -1725,7 +1725,7 @@
           <a:p>
             <a:fld id="{FB67B63D-A4AC-B040-8C24-6F4366BE519E}" type="datetimeFigureOut">
               <a:rPr lang="en-US" smtClean="0"/>
-              <a:t>4/23/2024</a:t>
+              <a:t>4/24/2024</a:t>
             </a:fld>
             <a:endParaRPr lang="en-US"/>
           </a:p>
@@ -1949,7 +1949,7 @@
           <a:p>
             <a:fld id="{AA8A0EC6-5648-844A-8827-911B00959032}" type="datetimeFigureOut">
               <a:rPr lang="en-US" smtClean="0"/>
-              <a:t>4/23/2024</a:t>
+              <a:t>4/24/2024</a:t>
             </a:fld>
             <a:endParaRPr lang="en-US"/>
           </a:p>
@@ -2595,7 +2595,7 @@
           <a:p>
             <a:fld id="{AA8A0EC6-5648-844A-8827-911B00959032}" type="datetimeFigureOut">
               <a:rPr lang="en-US" smtClean="0"/>
-              <a:t>4/23/2024</a:t>
+              <a:t>4/24/2024</a:t>
             </a:fld>
             <a:endParaRPr lang="en-US"/>
           </a:p>
@@ -2790,7 +2790,7 @@
           <a:p>
             <a:fld id="{AA8A0EC6-5648-844A-8827-911B00959032}" type="datetimeFigureOut">
               <a:rPr lang="en-US" smtClean="0"/>
-              <a:t>4/23/2024</a:t>
+              <a:t>4/24/2024</a:t>
             </a:fld>
             <a:endParaRPr lang="en-US"/>
           </a:p>
@@ -3394,7 +3394,7 @@
           <a:p>
             <a:fld id="{AA8A0EC6-5648-844A-8827-911B00959032}" type="datetimeFigureOut">
               <a:rPr lang="en-US" smtClean="0"/>
-              <a:t>4/23/2024</a:t>
+              <a:t>4/24/2024</a:t>
             </a:fld>
             <a:endParaRPr lang="en-US"/>
           </a:p>
@@ -4051,7 +4051,7 @@
           <a:p>
             <a:fld id="{FB67B63D-A4AC-B040-8C24-6F4366BE519E}" type="datetimeFigureOut">
               <a:rPr lang="en-US" smtClean="0"/>
-              <a:t>4/23/2024</a:t>
+              <a:t>4/24/2024</a:t>
             </a:fld>
             <a:endParaRPr lang="en-US"/>
           </a:p>
@@ -4221,7 +4221,7 @@
           <a:p>
             <a:fld id="{FB67B63D-A4AC-B040-8C24-6F4366BE519E}" type="datetimeFigureOut">
               <a:rPr lang="en-US" smtClean="0"/>
-              <a:t>4/23/2024</a:t>
+              <a:t>4/24/2024</a:t>
             </a:fld>
             <a:endParaRPr lang="en-US"/>
           </a:p>
@@ -4467,7 +4467,7 @@
           <a:p>
             <a:fld id="{FB67B63D-A4AC-B040-8C24-6F4366BE519E}" type="datetimeFigureOut">
               <a:rPr lang="en-US" smtClean="0"/>
-              <a:t>4/23/2024</a:t>
+              <a:t>4/24/2024</a:t>
             </a:fld>
             <a:endParaRPr lang="en-US"/>
           </a:p>
@@ -4699,7 +4699,7 @@
           <a:p>
             <a:fld id="{FB67B63D-A4AC-B040-8C24-6F4366BE519E}" type="datetimeFigureOut">
               <a:rPr lang="en-US" smtClean="0"/>
-              <a:t>4/23/2024</a:t>
+              <a:t>4/24/2024</a:t>
             </a:fld>
             <a:endParaRPr lang="en-US"/>
           </a:p>
@@ -4887,7 +4887,7 @@
           <a:p>
             <a:fld id="{FB67B63D-A4AC-B040-8C24-6F4366BE519E}" type="datetimeFigureOut">
               <a:rPr lang="en-US" smtClean="0"/>
-              <a:t>4/23/2024</a:t>
+              <a:t>4/24/2024</a:t>
             </a:fld>
             <a:endParaRPr lang="en-US"/>
           </a:p>
@@ -5266,7 +5266,7 @@
           <a:p>
             <a:fld id="{FB67B63D-A4AC-B040-8C24-6F4366BE519E}" type="datetimeFigureOut">
               <a:rPr lang="en-US" smtClean="0"/>
-              <a:t>4/23/2024</a:t>
+              <a:t>4/24/2024</a:t>
             </a:fld>
             <a:endParaRPr lang="en-US"/>
           </a:p>
@@ -5384,7 +5384,7 @@
           <a:p>
             <a:fld id="{FB67B63D-A4AC-B040-8C24-6F4366BE519E}" type="datetimeFigureOut">
               <a:rPr lang="en-US" smtClean="0"/>
-              <a:t>4/23/2024</a:t>
+              <a:t>4/24/2024</a:t>
             </a:fld>
             <a:endParaRPr lang="en-US"/>
           </a:p>
@@ -5479,7 +5479,7 @@
           <a:p>
             <a:fld id="{FB67B63D-A4AC-B040-8C24-6F4366BE519E}" type="datetimeFigureOut">
               <a:rPr lang="en-US" smtClean="0"/>
-              <a:t>4/23/2024</a:t>
+              <a:t>4/24/2024</a:t>
             </a:fld>
             <a:endParaRPr lang="en-US"/>
           </a:p>
@@ -5756,7 +5756,7 @@
           <a:p>
             <a:fld id="{FB67B63D-A4AC-B040-8C24-6F4366BE519E}" type="datetimeFigureOut">
               <a:rPr lang="en-US" smtClean="0"/>
-              <a:t>4/23/2024</a:t>
+              <a:t>4/24/2024</a:t>
             </a:fld>
             <a:endParaRPr lang="en-US"/>
           </a:p>
@@ -6013,7 +6013,7 @@
           <a:p>
             <a:fld id="{FB67B63D-A4AC-B040-8C24-6F4366BE519E}" type="datetimeFigureOut">
               <a:rPr lang="en-US" smtClean="0"/>
-              <a:t>4/23/2024</a:t>
+              <a:t>4/24/2024</a:t>
             </a:fld>
             <a:endParaRPr lang="en-US"/>
           </a:p>
@@ -6183,7 +6183,7 @@
           <a:p>
             <a:fld id="{FB67B63D-A4AC-B040-8C24-6F4366BE519E}" type="datetimeFigureOut">
               <a:rPr lang="en-US" smtClean="0"/>
-              <a:t>4/23/2024</a:t>
+              <a:t>4/24/2024</a:t>
             </a:fld>
             <a:endParaRPr lang="en-US"/>
           </a:p>
@@ -6363,7 +6363,7 @@
           <a:p>
             <a:fld id="{FB67B63D-A4AC-B040-8C24-6F4366BE519E}" type="datetimeFigureOut">
               <a:rPr lang="en-US" smtClean="0"/>
-              <a:t>4/23/2024</a:t>
+              <a:t>4/24/2024</a:t>
             </a:fld>
             <a:endParaRPr lang="en-US"/>
           </a:p>
@@ -6627,7 +6627,7 @@
           <a:p>
             <a:fld id="{FB67B63D-A4AC-B040-8C24-6F4366BE519E}" type="datetimeFigureOut">
               <a:rPr lang="en-US" smtClean="0"/>
-              <a:t>4/23/2024</a:t>
+              <a:t>4/24/2024</a:t>
             </a:fld>
             <a:endParaRPr lang="en-US"/>
           </a:p>
@@ -6895,7 +6895,7 @@
           <a:p>
             <a:fld id="{FB67B63D-A4AC-B040-8C24-6F4366BE519E}" type="datetimeFigureOut">
               <a:rPr lang="en-US" smtClean="0"/>
-              <a:t>4/23/2024</a:t>
+              <a:t>4/24/2024</a:t>
             </a:fld>
             <a:endParaRPr lang="en-US"/>
           </a:p>
@@ -7310,7 +7310,7 @@
           <a:p>
             <a:fld id="{FB67B63D-A4AC-B040-8C24-6F4366BE519E}" type="datetimeFigureOut">
               <a:rPr lang="en-US" smtClean="0"/>
-              <a:t>4/23/2024</a:t>
+              <a:t>4/24/2024</a:t>
             </a:fld>
             <a:endParaRPr lang="en-US"/>
           </a:p>
@@ -7452,7 +7452,7 @@
           <a:p>
             <a:fld id="{FB67B63D-A4AC-B040-8C24-6F4366BE519E}" type="datetimeFigureOut">
               <a:rPr lang="en-US" smtClean="0"/>
-              <a:t>4/23/2024</a:t>
+              <a:t>4/24/2024</a:t>
             </a:fld>
             <a:endParaRPr lang="en-US"/>
           </a:p>
@@ -7565,7 +7565,7 @@
           <a:p>
             <a:fld id="{FB67B63D-A4AC-B040-8C24-6F4366BE519E}" type="datetimeFigureOut">
               <a:rPr lang="en-US" smtClean="0"/>
-              <a:t>4/23/2024</a:t>
+              <a:t>4/24/2024</a:t>
             </a:fld>
             <a:endParaRPr lang="en-US"/>
           </a:p>
@@ -7878,7 +7878,7 @@
           <a:p>
             <a:fld id="{FB67B63D-A4AC-B040-8C24-6F4366BE519E}" type="datetimeFigureOut">
               <a:rPr lang="en-US" smtClean="0"/>
-              <a:t>4/23/2024</a:t>
+              <a:t>4/24/2024</a:t>
             </a:fld>
             <a:endParaRPr lang="en-US"/>
           </a:p>
@@ -8167,7 +8167,7 @@
           <a:p>
             <a:fld id="{FB67B63D-A4AC-B040-8C24-6F4366BE519E}" type="datetimeFigureOut">
               <a:rPr lang="en-US" smtClean="0"/>
-              <a:t>4/23/2024</a:t>
+              <a:t>4/24/2024</a:t>
             </a:fld>
             <a:endParaRPr lang="en-US"/>
           </a:p>
@@ -8410,7 +8410,7 @@
           <a:p>
             <a:fld id="{FB67B63D-A4AC-B040-8C24-6F4366BE519E}" type="datetimeFigureOut">
               <a:rPr lang="en-US" smtClean="0"/>
-              <a:t>4/23/2024</a:t>
+              <a:t>4/24/2024</a:t>
             </a:fld>
             <a:endParaRPr lang="en-US"/>
           </a:p>
@@ -8966,7 +8966,7 @@
           <a:p>
             <a:fld id="{FB67B63D-A4AC-B040-8C24-6F4366BE519E}" type="datetimeFigureOut">
               <a:rPr lang="en-US" smtClean="0"/>
-              <a:t>4/23/2024</a:t>
+              <a:t>4/24/2024</a:t>
             </a:fld>
             <a:endParaRPr lang="en-US"/>
           </a:p>
@@ -9566,7 +9566,7 @@
             </a:pPr>
             <a:r>
               <a:rPr lang="en-US" sz="1800" b="0" dirty="0"/>
-              <a:t>Planning meetings, demos, ..etc.</a:t>
+              <a:t>Planning meetings, and demos.</a:t>
             </a:r>
           </a:p>
           <a:p>
@@ -9576,7 +9576,7 @@
             </a:pPr>
             <a:r>
               <a:rPr lang="en-US" sz="1800" b="0" dirty="0"/>
-              <a:t>Quick exchanging of updates regarding issues, stories progress, etc.</a:t>
+              <a:t>Quick exchange of updates regarding issues, stories progress, and other important matters.</a:t>
             </a:r>
           </a:p>
         </p:txBody>

</xml_diff>